<commit_message>
update with new folder structure and figures for control analyses
</commit_message>
<xml_diff>
--- a/KiaMeeting_October2023pptx.pptx
+++ b/KiaMeeting_October2023pptx.pptx
@@ -5,13 +5,18 @@
     <p:sldMasterId id="2147483648" r:id="rId1"/>
   </p:sldMasterIdLst>
   <p:notesMasterIdLst>
-    <p:notesMasterId r:id="rId6"/>
+    <p:notesMasterId r:id="rId11"/>
   </p:notesMasterIdLst>
   <p:sldIdLst>
     <p:sldId id="256" r:id="rId2"/>
     <p:sldId id="257" r:id="rId3"/>
     <p:sldId id="258" r:id="rId4"/>
-    <p:sldId id="259" r:id="rId5"/>
+    <p:sldId id="262" r:id="rId5"/>
+    <p:sldId id="263" r:id="rId6"/>
+    <p:sldId id="259" r:id="rId7"/>
+    <p:sldId id="264" r:id="rId8"/>
+    <p:sldId id="260" r:id="rId9"/>
+    <p:sldId id="261" r:id="rId10"/>
   </p:sldIdLst>
   <p:sldSz cx="12192000" cy="6858000"/>
   <p:notesSz cx="6858000" cy="9144000"/>
@@ -110,6 +115,11 @@
       </a:defRPr>
     </a:lvl9pPr>
   </p:defaultTextStyle>
+  <p:extLst>
+    <p:ext uri="{EFAFB233-063F-42B5-8137-9DF3F51BA10A}">
+      <p15:sldGuideLst xmlns:p15="http://schemas.microsoft.com/office/powerpoint/2012/main"/>
+    </p:ext>
+  </p:extLst>
 </p:presentation>
 </file>
 
@@ -195,7 +205,7 @@
           <a:p>
             <a:fld id="{75B50A7E-FC27-46F3-B0DE-7B85B7AED7D2}" type="datetimeFigureOut">
               <a:rPr lang="en-GB" smtClean="0"/>
-              <a:t>02/10/2023</a:t>
+              <a:t>18/10/2023</a:t>
             </a:fld>
             <a:endParaRPr lang="en-GB"/>
           </a:p>
@@ -508,7 +518,94 @@
           <a:p>
             <a:r>
               <a:rPr lang="en-GB" dirty="0"/>
-              <a:t>Note, have not done this for the LMM version, but probably should</a:t>
+              <a:t>Also done this for the linear mixed effects model analysis (figures not shown)</a:t>
+            </a:r>
+          </a:p>
+        </p:txBody>
+      </p:sp>
+      <p:sp>
+        <p:nvSpPr>
+          <p:cNvPr id="4" name="Slide Number Placeholder 3"/>
+          <p:cNvSpPr>
+            <a:spLocks noGrp="1"/>
+          </p:cNvSpPr>
+          <p:nvPr>
+            <p:ph type="sldNum" sz="quarter" idx="5"/>
+          </p:nvPr>
+        </p:nvSpPr>
+        <p:spPr/>
+        <p:txBody>
+          <a:bodyPr/>
+          <a:lstStyle/>
+          <a:p>
+            <a:fld id="{7E8ED7D9-2EF5-462E-A8C5-71A50C7D2927}" type="slidenum">
+              <a:rPr lang="en-GB" smtClean="0"/>
+              <a:t>3</a:t>
+            </a:fld>
+            <a:endParaRPr lang="en-GB"/>
+          </a:p>
+        </p:txBody>
+      </p:sp>
+    </p:spTree>
+    <p:extLst>
+      <p:ext uri="{BB962C8B-B14F-4D97-AF65-F5344CB8AC3E}">
+        <p14:creationId xmlns:p14="http://schemas.microsoft.com/office/powerpoint/2010/main" val="248613459"/>
+      </p:ext>
+    </p:extLst>
+  </p:cSld>
+  <p:clrMapOvr>
+    <a:masterClrMapping/>
+  </p:clrMapOvr>
+</p:notes>
+</file>
+
+<file path=ppt/notesSlides/notesSlide2.xml><?xml version="1.0" encoding="utf-8"?>
+<p:notes xmlns:a="http://schemas.openxmlformats.org/drawingml/2006/main" xmlns:r="http://schemas.openxmlformats.org/officeDocument/2006/relationships" xmlns:p="http://schemas.openxmlformats.org/presentationml/2006/main">
+  <p:cSld>
+    <p:spTree>
+      <p:nvGrpSpPr>
+        <p:cNvPr id="1" name=""/>
+        <p:cNvGrpSpPr/>
+        <p:nvPr/>
+      </p:nvGrpSpPr>
+      <p:grpSpPr>
+        <a:xfrm>
+          <a:off x="0" y="0"/>
+          <a:ext cx="0" cy="0"/>
+          <a:chOff x="0" y="0"/>
+          <a:chExt cx="0" cy="0"/>
+        </a:xfrm>
+      </p:grpSpPr>
+      <p:sp>
+        <p:nvSpPr>
+          <p:cNvPr id="2" name="Slide Image Placeholder 1"/>
+          <p:cNvSpPr>
+            <a:spLocks noGrp="1" noRot="1" noChangeAspect="1"/>
+          </p:cNvSpPr>
+          <p:nvPr>
+            <p:ph type="sldImg"/>
+          </p:nvPr>
+        </p:nvSpPr>
+        <p:spPr/>
+      </p:sp>
+      <p:sp>
+        <p:nvSpPr>
+          <p:cNvPr id="3" name="Notes Placeholder 2"/>
+          <p:cNvSpPr>
+            <a:spLocks noGrp="1"/>
+          </p:cNvSpPr>
+          <p:nvPr>
+            <p:ph type="body" idx="1"/>
+          </p:nvPr>
+        </p:nvSpPr>
+        <p:spPr/>
+        <p:txBody>
+          <a:bodyPr/>
+          <a:lstStyle/>
+          <a:p>
+            <a:r>
+              <a:rPr lang="en-GB" dirty="0"/>
+              <a:t>Note, have done this for the LMM version too – same effect, our results don’t really stand under the null belief</a:t>
             </a:r>
           </a:p>
           <a:p>
@@ -586,7 +683,7 @@
           <a:p>
             <a:fld id="{7E8ED7D9-2EF5-462E-A8C5-71A50C7D2927}" type="slidenum">
               <a:rPr lang="en-GB" smtClean="0"/>
-              <a:t>4</a:t>
+              <a:t>6</a:t>
             </a:fld>
             <a:endParaRPr lang="en-GB"/>
           </a:p>
@@ -752,7 +849,7 @@
           <a:p>
             <a:fld id="{4AB30B83-7C01-4784-BF1C-5FF3A7B09DD1}" type="datetimeFigureOut">
               <a:rPr lang="en-GB" smtClean="0"/>
-              <a:t>02/10/2023</a:t>
+              <a:t>18/10/2023</a:t>
             </a:fld>
             <a:endParaRPr lang="en-GB"/>
           </a:p>
@@ -950,7 +1047,7 @@
           <a:p>
             <a:fld id="{4AB30B83-7C01-4784-BF1C-5FF3A7B09DD1}" type="datetimeFigureOut">
               <a:rPr lang="en-GB" smtClean="0"/>
-              <a:t>02/10/2023</a:t>
+              <a:t>18/10/2023</a:t>
             </a:fld>
             <a:endParaRPr lang="en-GB"/>
           </a:p>
@@ -1158,7 +1255,7 @@
           <a:p>
             <a:fld id="{4AB30B83-7C01-4784-BF1C-5FF3A7B09DD1}" type="datetimeFigureOut">
               <a:rPr lang="en-GB" smtClean="0"/>
-              <a:t>02/10/2023</a:t>
+              <a:t>18/10/2023</a:t>
             </a:fld>
             <a:endParaRPr lang="en-GB"/>
           </a:p>
@@ -1356,7 +1453,7 @@
           <a:p>
             <a:fld id="{4AB30B83-7C01-4784-BF1C-5FF3A7B09DD1}" type="datetimeFigureOut">
               <a:rPr lang="en-GB" smtClean="0"/>
-              <a:t>02/10/2023</a:t>
+              <a:t>18/10/2023</a:t>
             </a:fld>
             <a:endParaRPr lang="en-GB"/>
           </a:p>
@@ -1631,7 +1728,7 @@
           <a:p>
             <a:fld id="{4AB30B83-7C01-4784-BF1C-5FF3A7B09DD1}" type="datetimeFigureOut">
               <a:rPr lang="en-GB" smtClean="0"/>
-              <a:t>02/10/2023</a:t>
+              <a:t>18/10/2023</a:t>
             </a:fld>
             <a:endParaRPr lang="en-GB"/>
           </a:p>
@@ -1896,7 +1993,7 @@
           <a:p>
             <a:fld id="{4AB30B83-7C01-4784-BF1C-5FF3A7B09DD1}" type="datetimeFigureOut">
               <a:rPr lang="en-GB" smtClean="0"/>
-              <a:t>02/10/2023</a:t>
+              <a:t>18/10/2023</a:t>
             </a:fld>
             <a:endParaRPr lang="en-GB"/>
           </a:p>
@@ -2308,7 +2405,7 @@
           <a:p>
             <a:fld id="{4AB30B83-7C01-4784-BF1C-5FF3A7B09DD1}" type="datetimeFigureOut">
               <a:rPr lang="en-GB" smtClean="0"/>
-              <a:t>02/10/2023</a:t>
+              <a:t>18/10/2023</a:t>
             </a:fld>
             <a:endParaRPr lang="en-GB"/>
           </a:p>
@@ -2449,7 +2546,7 @@
           <a:p>
             <a:fld id="{4AB30B83-7C01-4784-BF1C-5FF3A7B09DD1}" type="datetimeFigureOut">
               <a:rPr lang="en-GB" smtClean="0"/>
-              <a:t>02/10/2023</a:t>
+              <a:t>18/10/2023</a:t>
             </a:fld>
             <a:endParaRPr lang="en-GB"/>
           </a:p>
@@ -2562,7 +2659,7 @@
           <a:p>
             <a:fld id="{4AB30B83-7C01-4784-BF1C-5FF3A7B09DD1}" type="datetimeFigureOut">
               <a:rPr lang="en-GB" smtClean="0"/>
-              <a:t>02/10/2023</a:t>
+              <a:t>18/10/2023</a:t>
             </a:fld>
             <a:endParaRPr lang="en-GB"/>
           </a:p>
@@ -2873,7 +2970,7 @@
           <a:p>
             <a:fld id="{4AB30B83-7C01-4784-BF1C-5FF3A7B09DD1}" type="datetimeFigureOut">
               <a:rPr lang="en-GB" smtClean="0"/>
-              <a:t>02/10/2023</a:t>
+              <a:t>18/10/2023</a:t>
             </a:fld>
             <a:endParaRPr lang="en-GB"/>
           </a:p>
@@ -3161,7 +3258,7 @@
           <a:p>
             <a:fld id="{4AB30B83-7C01-4784-BF1C-5FF3A7B09DD1}" type="datetimeFigureOut">
               <a:rPr lang="en-GB" smtClean="0"/>
-              <a:t>02/10/2023</a:t>
+              <a:t>18/10/2023</a:t>
             </a:fld>
             <a:endParaRPr lang="en-GB"/>
           </a:p>
@@ -3402,7 +3499,7 @@
           <a:p>
             <a:fld id="{4AB30B83-7C01-4784-BF1C-5FF3A7B09DD1}" type="datetimeFigureOut">
               <a:rPr lang="en-GB" smtClean="0"/>
-              <a:t>02/10/2023</a:t>
+              <a:t>18/10/2023</a:t>
             </a:fld>
             <a:endParaRPr lang="en-GB"/>
           </a:p>
@@ -4730,10 +4827,10 @@
       </p:grpSpPr>
       <p:pic>
         <p:nvPicPr>
-          <p:cNvPr id="14" name="Picture 13">
-            <a:extLst>
-              <a:ext uri="{FF2B5EF4-FFF2-40B4-BE49-F238E27FC236}">
-                <a16:creationId xmlns:a16="http://schemas.microsoft.com/office/drawing/2014/main" id="{FF8475B8-74B6-4725-954D-E62D1E721A63}"/>
+          <p:cNvPr id="3" name="Picture 2">
+            <a:extLst>
+              <a:ext uri="{FF2B5EF4-FFF2-40B4-BE49-F238E27FC236}">
+                <a16:creationId xmlns:a16="http://schemas.microsoft.com/office/drawing/2014/main" id="{3E62B50A-5649-4940-88E3-432523514CE5}"/>
               </a:ext>
             </a:extLst>
           </p:cNvPr>
@@ -4743,7 +4840,7 @@
           <p:nvPr/>
         </p:nvPicPr>
         <p:blipFill>
-          <a:blip r:embed="rId2">
+          <a:blip r:embed="rId3">
             <a:extLst>
               <a:ext uri="{28A0092B-C50C-407E-A947-70E740481C1C}">
                 <a14:useLocalDpi xmlns:a14="http://schemas.microsoft.com/office/drawing/2010/main" val="0"/>
@@ -4756,8 +4853,8 @@
         </p:blipFill>
         <p:spPr>
           <a:xfrm>
-            <a:off x="1633828" y="401440"/>
-            <a:ext cx="9306360" cy="4540567"/>
+            <a:off x="2087261" y="828861"/>
+            <a:ext cx="7575721" cy="4454637"/>
           </a:xfrm>
           <a:prstGeom prst="rect">
             <a:avLst/>
@@ -4779,7 +4876,7 @@
         <p:spPr>
           <a:xfrm>
             <a:off x="329961" y="293494"/>
-            <a:ext cx="6094562" cy="369332"/>
+            <a:ext cx="6800182" cy="369332"/>
           </a:xfrm>
           <a:prstGeom prst="rect">
             <a:avLst/>
@@ -4797,7 +4894,7 @@
                 <a:latin typeface="Source Sans Pro Light" panose="020B0403030403020204" pitchFamily="34" charset="0"/>
                 <a:ea typeface="Source Sans Pro Light" panose="020B0403030403020204" pitchFamily="34" charset="0"/>
               </a:rPr>
-              <a:t>1. Permutation-based control analysis</a:t>
+              <a:t>1A. Permutation-based control analysis -  confidence ~ error correlation</a:t>
             </a:r>
           </a:p>
         </p:txBody>
@@ -4816,7 +4913,7 @@
         </p:nvSpPr>
         <p:spPr>
           <a:xfrm>
-            <a:off x="329961" y="5038960"/>
+            <a:off x="329961" y="5283498"/>
             <a:ext cx="8396850" cy="1313180"/>
           </a:xfrm>
           <a:prstGeom prst="rect">
@@ -4933,6 +5030,142 @@
       </p:grpSpPr>
       <p:sp>
         <p:nvSpPr>
+          <p:cNvPr id="4" name="TextBox 3">
+            <a:extLst>
+              <a:ext uri="{FF2B5EF4-FFF2-40B4-BE49-F238E27FC236}">
+                <a16:creationId xmlns:a16="http://schemas.microsoft.com/office/drawing/2014/main" id="{92925D1E-963D-D342-BB50-4AF237970060}"/>
+              </a:ext>
+            </a:extLst>
+          </p:cNvPr>
+          <p:cNvSpPr txBox="1"/>
+          <p:nvPr/>
+        </p:nvSpPr>
+        <p:spPr>
+          <a:xfrm>
+            <a:off x="329961" y="293494"/>
+            <a:ext cx="6800182" cy="369332"/>
+          </a:xfrm>
+          <a:prstGeom prst="rect">
+            <a:avLst/>
+          </a:prstGeom>
+          <a:noFill/>
+        </p:spPr>
+        <p:txBody>
+          <a:bodyPr wrap="square">
+            <a:spAutoFit/>
+          </a:bodyPr>
+          <a:lstStyle/>
+          <a:p>
+            <a:r>
+              <a:rPr lang="en-GB" dirty="0">
+                <a:latin typeface="Source Sans Pro Light" panose="020B0403030403020204" pitchFamily="34" charset="0"/>
+                <a:ea typeface="Source Sans Pro Light" panose="020B0403030403020204" pitchFamily="34" charset="0"/>
+              </a:rPr>
+              <a:t>1B. Permutation-based control analysis -  random effects analysis</a:t>
+            </a:r>
+          </a:p>
+        </p:txBody>
+      </p:sp>
+    </p:spTree>
+    <p:extLst>
+      <p:ext uri="{BB962C8B-B14F-4D97-AF65-F5344CB8AC3E}">
+        <p14:creationId xmlns:p14="http://schemas.microsoft.com/office/powerpoint/2010/main" val="1063983753"/>
+      </p:ext>
+    </p:extLst>
+  </p:cSld>
+  <p:clrMapOvr>
+    <a:masterClrMapping/>
+  </p:clrMapOvr>
+</p:sld>
+</file>
+
+<file path=ppt/slides/slide5.xml><?xml version="1.0" encoding="utf-8"?>
+<p:sld xmlns:a="http://schemas.openxmlformats.org/drawingml/2006/main" xmlns:r="http://schemas.openxmlformats.org/officeDocument/2006/relationships" xmlns:p="http://schemas.openxmlformats.org/presentationml/2006/main">
+  <p:cSld>
+    <p:spTree>
+      <p:nvGrpSpPr>
+        <p:cNvPr id="1" name=""/>
+        <p:cNvGrpSpPr/>
+        <p:nvPr/>
+      </p:nvGrpSpPr>
+      <p:grpSpPr>
+        <a:xfrm>
+          <a:off x="0" y="0"/>
+          <a:ext cx="0" cy="0"/>
+          <a:chOff x="0" y="0"/>
+          <a:chExt cx="0" cy="0"/>
+        </a:xfrm>
+      </p:grpSpPr>
+      <p:sp>
+        <p:nvSpPr>
+          <p:cNvPr id="4" name="TextBox 3">
+            <a:extLst>
+              <a:ext uri="{FF2B5EF4-FFF2-40B4-BE49-F238E27FC236}">
+                <a16:creationId xmlns:a16="http://schemas.microsoft.com/office/drawing/2014/main" id="{5A4D07E3-AFBD-064F-A607-F436468C71A2}"/>
+              </a:ext>
+            </a:extLst>
+          </p:cNvPr>
+          <p:cNvSpPr txBox="1"/>
+          <p:nvPr/>
+        </p:nvSpPr>
+        <p:spPr>
+          <a:xfrm>
+            <a:off x="329961" y="293494"/>
+            <a:ext cx="6800182" cy="369332"/>
+          </a:xfrm>
+          <a:prstGeom prst="rect">
+            <a:avLst/>
+          </a:prstGeom>
+          <a:noFill/>
+        </p:spPr>
+        <p:txBody>
+          <a:bodyPr wrap="square">
+            <a:spAutoFit/>
+          </a:bodyPr>
+          <a:lstStyle/>
+          <a:p>
+            <a:r>
+              <a:rPr lang="en-GB" dirty="0">
+                <a:latin typeface="Source Sans Pro Light" panose="020B0403030403020204" pitchFamily="34" charset="0"/>
+                <a:ea typeface="Source Sans Pro Light" panose="020B0403030403020204" pitchFamily="34" charset="0"/>
+              </a:rPr>
+              <a:t>1B. Permutation-based control analysis -  linear mixed-effects analysis</a:t>
+            </a:r>
+          </a:p>
+        </p:txBody>
+      </p:sp>
+    </p:spTree>
+    <p:extLst>
+      <p:ext uri="{BB962C8B-B14F-4D97-AF65-F5344CB8AC3E}">
+        <p14:creationId xmlns:p14="http://schemas.microsoft.com/office/powerpoint/2010/main" val="1712747190"/>
+      </p:ext>
+    </p:extLst>
+  </p:cSld>
+  <p:clrMapOvr>
+    <a:masterClrMapping/>
+  </p:clrMapOvr>
+</p:sld>
+</file>
+
+<file path=ppt/slides/slide6.xml><?xml version="1.0" encoding="utf-8"?>
+<p:sld xmlns:a="http://schemas.openxmlformats.org/drawingml/2006/main" xmlns:r="http://schemas.openxmlformats.org/officeDocument/2006/relationships" xmlns:p="http://schemas.openxmlformats.org/presentationml/2006/main">
+  <p:cSld>
+    <p:spTree>
+      <p:nvGrpSpPr>
+        <p:cNvPr id="1" name=""/>
+        <p:cNvGrpSpPr/>
+        <p:nvPr/>
+      </p:nvGrpSpPr>
+      <p:grpSpPr>
+        <a:xfrm>
+          <a:off x="0" y="0"/>
+          <a:ext cx="0" cy="0"/>
+          <a:chOff x="0" y="0"/>
+          <a:chExt cx="0" cy="0"/>
+        </a:xfrm>
+      </p:grpSpPr>
+      <p:sp>
+        <p:nvSpPr>
           <p:cNvPr id="5" name="TextBox 4">
             <a:extLst>
               <a:ext uri="{FF2B5EF4-FFF2-40B4-BE49-F238E27FC236}">
@@ -4983,8 +5216,8 @@
         </p:nvSpPr>
         <p:spPr>
           <a:xfrm>
-            <a:off x="329960" y="903094"/>
-            <a:ext cx="8061565" cy="5909310"/>
+            <a:off x="329961" y="5276805"/>
+            <a:ext cx="8061565" cy="954107"/>
           </a:xfrm>
           <a:prstGeom prst="rect">
             <a:avLst/>
@@ -5002,36 +5235,7 @@
                 <a:latin typeface="Source Sans Pro Light" panose="020B0403030403020204" pitchFamily="34" charset="0"/>
                 <a:ea typeface="Source Sans Pro Light" panose="020B0403030403020204" pitchFamily="34" charset="0"/>
               </a:rPr>
-              <a:t>Can we simulate what the relationship </a:t>
-            </a:r>
-            <a:r>
-              <a:rPr lang="en-GB" sz="1400" u="sng" dirty="0">
-                <a:latin typeface="Source Sans Pro Light" panose="020B0403030403020204" pitchFamily="34" charset="0"/>
-                <a:ea typeface="Source Sans Pro Light" panose="020B0403030403020204" pitchFamily="34" charset="0"/>
-              </a:rPr>
-              <a:t>could</a:t>
-            </a:r>
-            <a:r>
-              <a:rPr lang="en-GB" sz="1400" dirty="0">
-                <a:latin typeface="Source Sans Pro Light" panose="020B0403030403020204" pitchFamily="34" charset="0"/>
-                <a:ea typeface="Source Sans Pro Light" panose="020B0403030403020204" pitchFamily="34" charset="0"/>
-              </a:rPr>
-              <a:t> look like under the belief that people don’t have single trial insight, but instead have perfect knowledge of their across-trial error distribution?</a:t>
-            </a:r>
-          </a:p>
-          <a:p>
-            <a:endParaRPr lang="en-GB" sz="1400" dirty="0">
-              <a:latin typeface="Source Sans Pro Light" panose="020B0403030403020204" pitchFamily="34" charset="0"/>
-              <a:ea typeface="Source Sans Pro Light" panose="020B0403030403020204" pitchFamily="34" charset="0"/>
-            </a:endParaRPr>
-          </a:p>
-          <a:p>
-            <a:r>
-              <a:rPr lang="en-GB" sz="1400" dirty="0">
-                <a:latin typeface="Source Sans Pro Light" panose="020B0403030403020204" pitchFamily="34" charset="0"/>
-                <a:ea typeface="Source Sans Pro Light" panose="020B0403030403020204" pitchFamily="34" charset="0"/>
-              </a:rPr>
-              <a:t>Run 10,000 simulations where we:</a:t>
+              <a:t>Using this simulation based approach, the empirically observed effects in experiment 1 (in both a simulated random-effects analysis and linear mixed-effects analysis) are significant</a:t>
             </a:r>
           </a:p>
           <a:p>
@@ -5044,236 +5248,8 @@
                 <a:latin typeface="Source Sans Pro Light" panose="020B0403030403020204" pitchFamily="34" charset="0"/>
                 <a:ea typeface="Source Sans Pro Light" panose="020B0403030403020204" pitchFamily="34" charset="0"/>
               </a:rPr>
-              <a:t>Simulate error distributions for neutral and cued trials separately, for 20 subjects in each simulated data set</a:t>
-            </a:r>
-          </a:p>
-          <a:p>
-            <a:pPr marL="285750" indent="-285750">
-              <a:buFontTx/>
-              <a:buChar char="-"/>
-            </a:pPr>
-            <a:r>
-              <a:rPr lang="en-GB" sz="1400" dirty="0">
-                <a:latin typeface="Source Sans Pro Light" panose="020B0403030403020204" pitchFamily="34" charset="0"/>
-                <a:ea typeface="Source Sans Pro Light" panose="020B0403030403020204" pitchFamily="34" charset="0"/>
-              </a:rPr>
-              <a:t>For each simulated participant, generate a ‘confidence’ on each ‘trial’ by randomly sampling from the absolute error distribution for the condition.</a:t>
-            </a:r>
-          </a:p>
-          <a:p>
-            <a:pPr marL="742950" lvl="1" indent="-285750">
-              <a:buFontTx/>
-              <a:buChar char="-"/>
-            </a:pPr>
-            <a:r>
-              <a:rPr lang="en-GB" sz="1400" dirty="0">
-                <a:latin typeface="Source Sans Pro Light" panose="020B0403030403020204" pitchFamily="34" charset="0"/>
-                <a:ea typeface="Source Sans Pro Light" panose="020B0403030403020204" pitchFamily="34" charset="0"/>
-              </a:rPr>
-              <a:t>This simulates what confidence would look like with perfect insight into across-trial performance, but not the single-trial response error (</a:t>
-            </a:r>
-            <a:r>
-              <a:rPr lang="en-GB" sz="1400" i="1" dirty="0">
-                <a:latin typeface="Source Sans Pro Light" panose="020B0403030403020204" pitchFamily="34" charset="0"/>
-                <a:ea typeface="Source Sans Pro Light" panose="020B0403030403020204" pitchFamily="34" charset="0"/>
-              </a:rPr>
-              <a:t>the null hypothesis</a:t>
-            </a:r>
-            <a:r>
-              <a:rPr lang="en-GB" sz="1400" dirty="0">
-                <a:latin typeface="Source Sans Pro Light" panose="020B0403030403020204" pitchFamily="34" charset="0"/>
-                <a:ea typeface="Source Sans Pro Light" panose="020B0403030403020204" pitchFamily="34" charset="0"/>
-              </a:rPr>
-              <a:t>)</a:t>
-            </a:r>
-          </a:p>
-          <a:p>
-            <a:pPr marL="285750" indent="-285750">
-              <a:buFontTx/>
-              <a:buChar char="-"/>
-            </a:pPr>
-            <a:r>
-              <a:rPr lang="en-GB" sz="1400" dirty="0">
-                <a:latin typeface="Source Sans Pro Light" panose="020B0403030403020204" pitchFamily="34" charset="0"/>
-                <a:ea typeface="Source Sans Pro Light" panose="020B0403030403020204" pitchFamily="34" charset="0"/>
-              </a:rPr>
-              <a:t>Run the analysis looking at confidence ~ error as a function of cue condition for the simulated dataset</a:t>
-            </a:r>
-          </a:p>
-          <a:p>
-            <a:pPr marL="285750" indent="-285750">
-              <a:buFontTx/>
-              <a:buChar char="-"/>
-            </a:pPr>
-            <a:r>
-              <a:rPr lang="en-GB" sz="1400" dirty="0">
-                <a:latin typeface="Source Sans Pro Light" panose="020B0403030403020204" pitchFamily="34" charset="0"/>
-                <a:ea typeface="Source Sans Pro Light" panose="020B0403030403020204" pitchFamily="34" charset="0"/>
-              </a:rPr>
-              <a:t>Store the t-value for the error*cue interaction here (the difference in error ~ confidence slope between cue conditions)</a:t>
-            </a:r>
-          </a:p>
-          <a:p>
-            <a:pPr marL="285750" indent="-285750">
-              <a:buFontTx/>
-              <a:buChar char="-"/>
-            </a:pPr>
-            <a:r>
-              <a:rPr lang="en-GB" sz="1400" dirty="0">
-                <a:latin typeface="Source Sans Pro Light" panose="020B0403030403020204" pitchFamily="34" charset="0"/>
-                <a:ea typeface="Source Sans Pro Light" panose="020B0403030403020204" pitchFamily="34" charset="0"/>
-              </a:rPr>
-              <a:t>Repeat this 10,000 times</a:t>
-            </a:r>
-          </a:p>
-          <a:p>
-            <a:pPr marL="285750" indent="-285750">
-              <a:buFontTx/>
-              <a:buChar char="-"/>
-            </a:pPr>
-            <a:r>
-              <a:rPr lang="en-GB" sz="1400" dirty="0">
-                <a:latin typeface="Source Sans Pro Light" panose="020B0403030403020204" pitchFamily="34" charset="0"/>
-                <a:ea typeface="Source Sans Pro Light" panose="020B0403030403020204" pitchFamily="34" charset="0"/>
-              </a:rPr>
-              <a:t>Generate </a:t>
-            </a:r>
-            <a:r>
-              <a:rPr lang="en-GB" sz="1400" i="1" dirty="0">
-                <a:latin typeface="Source Sans Pro Light" panose="020B0403030403020204" pitchFamily="34" charset="0"/>
-                <a:ea typeface="Source Sans Pro Light" panose="020B0403030403020204" pitchFamily="34" charset="0"/>
-              </a:rPr>
-              <a:t>null distribution </a:t>
-            </a:r>
-            <a:r>
-              <a:rPr lang="en-GB" sz="1400" dirty="0">
-                <a:latin typeface="Source Sans Pro Light" panose="020B0403030403020204" pitchFamily="34" charset="0"/>
-                <a:ea typeface="Source Sans Pro Light" panose="020B0403030403020204" pitchFamily="34" charset="0"/>
-              </a:rPr>
-              <a:t>of these t-values (effect sizes) that arise under the null hypothesis</a:t>
-            </a:r>
-          </a:p>
-          <a:p>
-            <a:pPr marL="285750" indent="-285750">
-              <a:buFontTx/>
-              <a:buChar char="-"/>
-            </a:pPr>
-            <a:r>
-              <a:rPr lang="en-GB" sz="1400" dirty="0">
-                <a:latin typeface="Source Sans Pro Light" panose="020B0403030403020204" pitchFamily="34" charset="0"/>
-                <a:ea typeface="Source Sans Pro Light" panose="020B0403030403020204" pitchFamily="34" charset="0"/>
-              </a:rPr>
-              <a:t>Proportion of t-values larger than our </a:t>
-            </a:r>
-            <a:r>
-              <a:rPr lang="en-GB" sz="1400" i="1" dirty="0">
-                <a:latin typeface="Source Sans Pro Light" panose="020B0403030403020204" pitchFamily="34" charset="0"/>
-                <a:ea typeface="Source Sans Pro Light" panose="020B0403030403020204" pitchFamily="34" charset="0"/>
-              </a:rPr>
-              <a:t>observed</a:t>
-            </a:r>
-            <a:r>
-              <a:rPr lang="en-GB" sz="1400" dirty="0">
-                <a:latin typeface="Source Sans Pro Light" panose="020B0403030403020204" pitchFamily="34" charset="0"/>
-                <a:ea typeface="Source Sans Pro Light" panose="020B0403030403020204" pitchFamily="34" charset="0"/>
-              </a:rPr>
-              <a:t> </a:t>
-            </a:r>
-            <a:r>
-              <a:rPr lang="en-GB" sz="1400" i="1" dirty="0">
-                <a:latin typeface="Source Sans Pro Light" panose="020B0403030403020204" pitchFamily="34" charset="0"/>
-                <a:ea typeface="Source Sans Pro Light" panose="020B0403030403020204" pitchFamily="34" charset="0"/>
-              </a:rPr>
-              <a:t>effect size</a:t>
-            </a:r>
-            <a:r>
-              <a:rPr lang="en-GB" sz="1400" dirty="0">
-                <a:latin typeface="Source Sans Pro Light" panose="020B0403030403020204" pitchFamily="34" charset="0"/>
-                <a:ea typeface="Source Sans Pro Light" panose="020B0403030403020204" pitchFamily="34" charset="0"/>
-              </a:rPr>
-              <a:t> is the p-value for our observed effect size</a:t>
-            </a:r>
-          </a:p>
-          <a:p>
-            <a:pPr marL="285750" indent="-285750">
-              <a:buFontTx/>
-              <a:buChar char="-"/>
-            </a:pPr>
-            <a:endParaRPr lang="en-GB" sz="1400" i="1" dirty="0">
-              <a:latin typeface="Source Sans Pro Light" panose="020B0403030403020204" pitchFamily="34" charset="0"/>
-              <a:ea typeface="Source Sans Pro Light" panose="020B0403030403020204" pitchFamily="34" charset="0"/>
-            </a:endParaRPr>
-          </a:p>
-          <a:p>
-            <a:pPr marL="285750" indent="-285750">
-              <a:buFontTx/>
-              <a:buChar char="-"/>
-            </a:pPr>
-            <a:endParaRPr lang="en-GB" sz="1400" i="1" dirty="0">
-              <a:latin typeface="Source Sans Pro Light" panose="020B0403030403020204" pitchFamily="34" charset="0"/>
-              <a:ea typeface="Source Sans Pro Light" panose="020B0403030403020204" pitchFamily="34" charset="0"/>
-            </a:endParaRPr>
-          </a:p>
-          <a:p>
-            <a:r>
-              <a:rPr lang="en-GB" sz="1400" dirty="0">
-                <a:latin typeface="Source Sans Pro Light" panose="020B0403030403020204" pitchFamily="34" charset="0"/>
-                <a:ea typeface="Source Sans Pro Light" panose="020B0403030403020204" pitchFamily="34" charset="0"/>
-              </a:rPr>
-              <a:t>For comparison with observed effect in a random-effects analysis (across-subject t-test of within-subject GLM interaction beta-weights)</a:t>
-            </a:r>
-          </a:p>
-          <a:p>
-            <a:pPr marL="285750" indent="-285750">
-              <a:buFontTx/>
-              <a:buChar char="-"/>
-            </a:pPr>
-            <a:r>
-              <a:rPr lang="en-GB" sz="1400" dirty="0">
-                <a:latin typeface="Source Sans Pro Light" panose="020B0403030403020204" pitchFamily="34" charset="0"/>
-                <a:ea typeface="Source Sans Pro Light" panose="020B0403030403020204" pitchFamily="34" charset="0"/>
-              </a:rPr>
-              <a:t>Observed interaction (t(19) = 2.689, p = 0.0145)</a:t>
-            </a:r>
-          </a:p>
-          <a:p>
-            <a:pPr marL="285750" indent="-285750">
-              <a:buFontTx/>
-              <a:buChar char="-"/>
-            </a:pPr>
-            <a:r>
-              <a:rPr lang="en-GB" sz="1400" i="1" dirty="0">
-                <a:latin typeface="Source Sans Pro Light" panose="020B0403030403020204" pitchFamily="34" charset="0"/>
-                <a:ea typeface="Source Sans Pro Light" panose="020B0403030403020204" pitchFamily="34" charset="0"/>
-              </a:rPr>
-              <a:t>p-value for this observed effect under the null: 0.0074 </a:t>
-            </a:r>
-            <a:r>
-              <a:rPr lang="en-GB" sz="1400" dirty="0">
-                <a:latin typeface="Source Sans Pro Light" panose="020B0403030403020204" pitchFamily="34" charset="0"/>
-                <a:ea typeface="Source Sans Pro Light" panose="020B0403030403020204" pitchFamily="34" charset="0"/>
-              </a:rPr>
-              <a:t>(0.74% of simulated interaction effects were larger than our observed effect)</a:t>
-            </a:r>
-          </a:p>
-          <a:p>
-            <a:pPr marL="742950" lvl="1" indent="-285750">
-              <a:buFontTx/>
-              <a:buChar char="-"/>
-            </a:pPr>
-            <a:r>
-              <a:rPr lang="en-GB" sz="1400" dirty="0">
-                <a:latin typeface="Source Sans Pro Light" panose="020B0403030403020204" pitchFamily="34" charset="0"/>
-                <a:ea typeface="Source Sans Pro Light" panose="020B0403030403020204" pitchFamily="34" charset="0"/>
-              </a:rPr>
-              <a:t>Suggests that our observed effect is unlikely to occur under the null hypothesis that confidence judgements were made with perfect insight into across-trial response error, but no insight into single-trial error</a:t>
-            </a:r>
-          </a:p>
-          <a:p>
-            <a:endParaRPr lang="en-GB" sz="1400" dirty="0">
-              <a:latin typeface="Source Sans Pro Light" panose="020B0403030403020204" pitchFamily="34" charset="0"/>
-              <a:ea typeface="Source Sans Pro Light" panose="020B0403030403020204" pitchFamily="34" charset="0"/>
-            </a:endParaRPr>
+              <a:t>Not expected under the null belief that confidence arises not from single-trial insight, but perfect knowledge of across-trial error</a:t>
+            </a:r>
           </a:p>
         </p:txBody>
       </p:sp>
@@ -5408,7 +5384,7 @@
         </p:blipFill>
         <p:spPr>
           <a:xfrm>
-            <a:off x="8334689" y="1718271"/>
+            <a:off x="12821345" y="5276805"/>
             <a:ext cx="3857311" cy="1486303"/>
           </a:xfrm>
           <a:prstGeom prst="rect">
@@ -5517,8 +5493,44 @@
         </p:blipFill>
         <p:spPr>
           <a:xfrm>
-            <a:off x="8476915" y="4047119"/>
+            <a:off x="17210819" y="2128157"/>
             <a:ext cx="3623270" cy="2715989"/>
+          </a:xfrm>
+          <a:prstGeom prst="rect">
+            <a:avLst/>
+          </a:prstGeom>
+        </p:spPr>
+      </p:pic>
+      <p:pic>
+        <p:nvPicPr>
+          <p:cNvPr id="4" name="Picture 3">
+            <a:extLst>
+              <a:ext uri="{FF2B5EF4-FFF2-40B4-BE49-F238E27FC236}">
+                <a16:creationId xmlns:a16="http://schemas.microsoft.com/office/drawing/2014/main" id="{8A415C7A-FDAE-D443-9347-619648DD4CE7}"/>
+              </a:ext>
+            </a:extLst>
+          </p:cNvPr>
+          <p:cNvPicPr>
+            <a:picLocks noChangeAspect="1"/>
+          </p:cNvPicPr>
+          <p:nvPr/>
+        </p:nvPicPr>
+        <p:blipFill>
+          <a:blip r:embed="rId6">
+            <a:extLst>
+              <a:ext uri="{28A0092B-C50C-407E-A947-70E740481C1C}">
+                <a14:useLocalDpi xmlns:a14="http://schemas.microsoft.com/office/drawing/2010/main" val="0"/>
+              </a:ext>
+            </a:extLst>
+          </a:blip>
+          <a:stretch>
+            <a:fillRect/>
+          </a:stretch>
+        </p:blipFill>
+        <p:spPr>
+          <a:xfrm>
+            <a:off x="768257" y="662827"/>
+            <a:ext cx="10121055" cy="4252544"/>
           </a:xfrm>
           <a:prstGeom prst="rect">
             <a:avLst/>
@@ -5529,6 +5541,356 @@
     <p:extLst>
       <p:ext uri="{BB962C8B-B14F-4D97-AF65-F5344CB8AC3E}">
         <p14:creationId xmlns:p14="http://schemas.microsoft.com/office/powerpoint/2010/main" val="209844950"/>
+      </p:ext>
+    </p:extLst>
+  </p:cSld>
+  <p:clrMapOvr>
+    <a:masterClrMapping/>
+  </p:clrMapOvr>
+</p:sld>
+</file>
+
+<file path=ppt/slides/slide7.xml><?xml version="1.0" encoding="utf-8"?>
+<p:sld xmlns:a="http://schemas.openxmlformats.org/drawingml/2006/main" xmlns:r="http://schemas.openxmlformats.org/officeDocument/2006/relationships" xmlns:p="http://schemas.openxmlformats.org/presentationml/2006/main">
+  <p:cSld>
+    <p:spTree>
+      <p:nvGrpSpPr>
+        <p:cNvPr id="1" name=""/>
+        <p:cNvGrpSpPr/>
+        <p:nvPr/>
+      </p:nvGrpSpPr>
+      <p:grpSpPr>
+        <a:xfrm>
+          <a:off x="0" y="0"/>
+          <a:ext cx="0" cy="0"/>
+          <a:chOff x="0" y="0"/>
+          <a:chExt cx="0" cy="0"/>
+        </a:xfrm>
+      </p:grpSpPr>
+      <p:sp>
+        <p:nvSpPr>
+          <p:cNvPr id="6" name="TextBox 5">
+            <a:extLst>
+              <a:ext uri="{FF2B5EF4-FFF2-40B4-BE49-F238E27FC236}">
+                <a16:creationId xmlns:a16="http://schemas.microsoft.com/office/drawing/2014/main" id="{3D020B15-E46B-8D47-9C56-082839851DAC}"/>
+              </a:ext>
+            </a:extLst>
+          </p:cNvPr>
+          <p:cNvSpPr txBox="1"/>
+          <p:nvPr/>
+        </p:nvSpPr>
+        <p:spPr>
+          <a:xfrm>
+            <a:off x="329961" y="293914"/>
+            <a:ext cx="2739810" cy="369332"/>
+          </a:xfrm>
+          <a:prstGeom prst="rect">
+            <a:avLst/>
+          </a:prstGeom>
+          <a:noFill/>
+        </p:spPr>
+        <p:txBody>
+          <a:bodyPr wrap="square">
+            <a:spAutoFit/>
+          </a:bodyPr>
+          <a:lstStyle/>
+          <a:p>
+            <a:r>
+              <a:rPr lang="en-GB" dirty="0">
+                <a:latin typeface="Source Sans Pro Light" panose="020B0403030403020204" pitchFamily="34" charset="0"/>
+                <a:ea typeface="Source Sans Pro Light" panose="020B0403030403020204" pitchFamily="34" charset="0"/>
+              </a:rPr>
+              <a:t>2. Simulation of effects</a:t>
+            </a:r>
+          </a:p>
+        </p:txBody>
+      </p:sp>
+      <p:sp>
+        <p:nvSpPr>
+          <p:cNvPr id="9" name="TextBox 8">
+            <a:extLst>
+              <a:ext uri="{FF2B5EF4-FFF2-40B4-BE49-F238E27FC236}">
+                <a16:creationId xmlns:a16="http://schemas.microsoft.com/office/drawing/2014/main" id="{7E7BB2BB-71EC-1942-B806-ACF122900DDC}"/>
+              </a:ext>
+            </a:extLst>
+          </p:cNvPr>
+          <p:cNvSpPr txBox="1"/>
+          <p:nvPr/>
+        </p:nvSpPr>
+        <p:spPr>
+          <a:xfrm>
+            <a:off x="1015761" y="1317170"/>
+            <a:ext cx="3371182" cy="369332"/>
+          </a:xfrm>
+          <a:prstGeom prst="rect">
+            <a:avLst/>
+          </a:prstGeom>
+          <a:noFill/>
+        </p:spPr>
+        <p:txBody>
+          <a:bodyPr wrap="square">
+            <a:spAutoFit/>
+          </a:bodyPr>
+          <a:lstStyle/>
+          <a:p>
+            <a:r>
+              <a:rPr lang="en-GB" dirty="0">
+                <a:latin typeface="Source Sans Pro Light" panose="020B0403030403020204" pitchFamily="34" charset="0"/>
+                <a:ea typeface="Source Sans Pro Light" panose="020B0403030403020204" pitchFamily="34" charset="0"/>
+              </a:rPr>
+              <a:t>2A. Random-effects simulation</a:t>
+            </a:r>
+          </a:p>
+        </p:txBody>
+      </p:sp>
+      <p:sp>
+        <p:nvSpPr>
+          <p:cNvPr id="10" name="TextBox 9">
+            <a:extLst>
+              <a:ext uri="{FF2B5EF4-FFF2-40B4-BE49-F238E27FC236}">
+                <a16:creationId xmlns:a16="http://schemas.microsoft.com/office/drawing/2014/main" id="{63B9863F-1E84-A046-9A92-8B187CDFF478}"/>
+              </a:ext>
+            </a:extLst>
+          </p:cNvPr>
+          <p:cNvSpPr txBox="1"/>
+          <p:nvPr/>
+        </p:nvSpPr>
+        <p:spPr>
+          <a:xfrm>
+            <a:off x="7786676" y="1306285"/>
+            <a:ext cx="3643324" cy="369332"/>
+          </a:xfrm>
+          <a:prstGeom prst="rect">
+            <a:avLst/>
+          </a:prstGeom>
+          <a:noFill/>
+        </p:spPr>
+        <p:txBody>
+          <a:bodyPr wrap="square">
+            <a:spAutoFit/>
+          </a:bodyPr>
+          <a:lstStyle/>
+          <a:p>
+            <a:r>
+              <a:rPr lang="en-GB" dirty="0">
+                <a:latin typeface="Source Sans Pro Light" panose="020B0403030403020204" pitchFamily="34" charset="0"/>
+                <a:ea typeface="Source Sans Pro Light" panose="020B0403030403020204" pitchFamily="34" charset="0"/>
+              </a:rPr>
+              <a:t>2A. Linear mixed-effects simulation</a:t>
+            </a:r>
+          </a:p>
+        </p:txBody>
+      </p:sp>
+    </p:spTree>
+    <p:extLst>
+      <p:ext uri="{BB962C8B-B14F-4D97-AF65-F5344CB8AC3E}">
+        <p14:creationId xmlns:p14="http://schemas.microsoft.com/office/powerpoint/2010/main" val="991722604"/>
+      </p:ext>
+    </p:extLst>
+  </p:cSld>
+  <p:clrMapOvr>
+    <a:masterClrMapping/>
+  </p:clrMapOvr>
+</p:sld>
+</file>
+
+<file path=ppt/slides/slide8.xml><?xml version="1.0" encoding="utf-8"?>
+<p:sld xmlns:a="http://schemas.openxmlformats.org/drawingml/2006/main" xmlns:r="http://schemas.openxmlformats.org/officeDocument/2006/relationships" xmlns:p="http://schemas.openxmlformats.org/presentationml/2006/main">
+  <p:cSld>
+    <p:spTree>
+      <p:nvGrpSpPr>
+        <p:cNvPr id="1" name=""/>
+        <p:cNvGrpSpPr/>
+        <p:nvPr/>
+      </p:nvGrpSpPr>
+      <p:grpSpPr>
+        <a:xfrm>
+          <a:off x="0" y="0"/>
+          <a:ext cx="0" cy="0"/>
+          <a:chOff x="0" y="0"/>
+          <a:chExt cx="0" cy="0"/>
+        </a:xfrm>
+      </p:grpSpPr>
+      <p:sp>
+        <p:nvSpPr>
+          <p:cNvPr id="6" name="TextBox 5">
+            <a:extLst>
+              <a:ext uri="{FF2B5EF4-FFF2-40B4-BE49-F238E27FC236}">
+                <a16:creationId xmlns:a16="http://schemas.microsoft.com/office/drawing/2014/main" id="{6A0F34CA-BBCF-294C-A508-1339074EDB33}"/>
+              </a:ext>
+            </a:extLst>
+          </p:cNvPr>
+          <p:cNvSpPr txBox="1"/>
+          <p:nvPr/>
+        </p:nvSpPr>
+        <p:spPr>
+          <a:xfrm>
+            <a:off x="448733" y="389467"/>
+            <a:ext cx="3667992" cy="369332"/>
+          </a:xfrm>
+          <a:prstGeom prst="rect">
+            <a:avLst/>
+          </a:prstGeom>
+          <a:noFill/>
+        </p:spPr>
+        <p:txBody>
+          <a:bodyPr wrap="none" rtlCol="0">
+            <a:spAutoFit/>
+          </a:bodyPr>
+          <a:lstStyle/>
+          <a:p>
+            <a:r>
+              <a:rPr lang="en-GB" dirty="0">
+                <a:latin typeface="Source Sans Pro Light" panose="020B0403030403020204" pitchFamily="34" charset="0"/>
+                <a:ea typeface="Source Sans Pro Light" panose="020B0403030403020204" pitchFamily="34" charset="0"/>
+              </a:rPr>
+              <a:t>Confidence EEG data – extra analyses</a:t>
+            </a:r>
+          </a:p>
+        </p:txBody>
+      </p:sp>
+      <p:pic>
+        <p:nvPicPr>
+          <p:cNvPr id="8" name="Picture 7">
+            <a:extLst>
+              <a:ext uri="{FF2B5EF4-FFF2-40B4-BE49-F238E27FC236}">
+                <a16:creationId xmlns:a16="http://schemas.microsoft.com/office/drawing/2014/main" id="{9D8FC46B-3E27-AF44-9B41-FDD8784A5ADD}"/>
+              </a:ext>
+            </a:extLst>
+          </p:cNvPr>
+          <p:cNvPicPr>
+            <a:picLocks noChangeAspect="1"/>
+          </p:cNvPicPr>
+          <p:nvPr/>
+        </p:nvPicPr>
+        <p:blipFill rotWithShape="1">
+          <a:blip r:embed="rId2">
+            <a:extLst>
+              <a:ext uri="{28A0092B-C50C-407E-A947-70E740481C1C}">
+                <a14:useLocalDpi xmlns:a14="http://schemas.microsoft.com/office/drawing/2010/main" val="0"/>
+              </a:ext>
+            </a:extLst>
+          </a:blip>
+          <a:srcRect b="32102"/>
+          <a:stretch/>
+        </p:blipFill>
+        <p:spPr>
+          <a:xfrm>
+            <a:off x="1000571" y="887467"/>
+            <a:ext cx="10309686" cy="5437134"/>
+          </a:xfrm>
+          <a:prstGeom prst="rect">
+            <a:avLst/>
+          </a:prstGeom>
+        </p:spPr>
+      </p:pic>
+    </p:spTree>
+    <p:extLst>
+      <p:ext uri="{BB962C8B-B14F-4D97-AF65-F5344CB8AC3E}">
+        <p14:creationId xmlns:p14="http://schemas.microsoft.com/office/powerpoint/2010/main" val="2735668428"/>
+      </p:ext>
+    </p:extLst>
+  </p:cSld>
+  <p:clrMapOvr>
+    <a:masterClrMapping/>
+  </p:clrMapOvr>
+</p:sld>
+</file>
+
+<file path=ppt/slides/slide9.xml><?xml version="1.0" encoding="utf-8"?>
+<p:sld xmlns:a="http://schemas.openxmlformats.org/drawingml/2006/main" xmlns:r="http://schemas.openxmlformats.org/officeDocument/2006/relationships" xmlns:p="http://schemas.openxmlformats.org/presentationml/2006/main">
+  <p:cSld>
+    <p:spTree>
+      <p:nvGrpSpPr>
+        <p:cNvPr id="1" name=""/>
+        <p:cNvGrpSpPr/>
+        <p:nvPr/>
+      </p:nvGrpSpPr>
+      <p:grpSpPr>
+        <a:xfrm>
+          <a:off x="0" y="0"/>
+          <a:ext cx="0" cy="0"/>
+          <a:chOff x="0" y="0"/>
+          <a:chExt cx="0" cy="0"/>
+        </a:xfrm>
+      </p:grpSpPr>
+      <p:sp>
+        <p:nvSpPr>
+          <p:cNvPr id="6" name="TextBox 5">
+            <a:extLst>
+              <a:ext uri="{FF2B5EF4-FFF2-40B4-BE49-F238E27FC236}">
+                <a16:creationId xmlns:a16="http://schemas.microsoft.com/office/drawing/2014/main" id="{6A0F34CA-BBCF-294C-A508-1339074EDB33}"/>
+              </a:ext>
+            </a:extLst>
+          </p:cNvPr>
+          <p:cNvSpPr txBox="1"/>
+          <p:nvPr/>
+        </p:nvSpPr>
+        <p:spPr>
+          <a:xfrm>
+            <a:off x="448733" y="389467"/>
+            <a:ext cx="2553904" cy="369332"/>
+          </a:xfrm>
+          <a:prstGeom prst="rect">
+            <a:avLst/>
+          </a:prstGeom>
+          <a:noFill/>
+        </p:spPr>
+        <p:txBody>
+          <a:bodyPr wrap="none" rtlCol="0">
+            <a:spAutoFit/>
+          </a:bodyPr>
+          <a:lstStyle/>
+          <a:p>
+            <a:r>
+              <a:rPr lang="en-GB" dirty="0">
+                <a:latin typeface="Source Sans Pro Light" panose="020B0403030403020204" pitchFamily="34" charset="0"/>
+                <a:ea typeface="Source Sans Pro Light" panose="020B0403030403020204" pitchFamily="34" charset="0"/>
+              </a:rPr>
+              <a:t>EEG data – extra analyses</a:t>
+            </a:r>
+          </a:p>
+        </p:txBody>
+      </p:sp>
+      <p:pic>
+        <p:nvPicPr>
+          <p:cNvPr id="8" name="Picture 7">
+            <a:extLst>
+              <a:ext uri="{FF2B5EF4-FFF2-40B4-BE49-F238E27FC236}">
+                <a16:creationId xmlns:a16="http://schemas.microsoft.com/office/drawing/2014/main" id="{9D8FC46B-3E27-AF44-9B41-FDD8784A5ADD}"/>
+              </a:ext>
+            </a:extLst>
+          </p:cNvPr>
+          <p:cNvPicPr>
+            <a:picLocks noChangeAspect="1"/>
+          </p:cNvPicPr>
+          <p:nvPr/>
+        </p:nvPicPr>
+        <p:blipFill rotWithShape="1">
+          <a:blip r:embed="rId2">
+            <a:extLst>
+              <a:ext uri="{28A0092B-C50C-407E-A947-70E740481C1C}">
+                <a14:useLocalDpi xmlns:a14="http://schemas.microsoft.com/office/drawing/2010/main" val="0"/>
+              </a:ext>
+            </a:extLst>
+          </a:blip>
+          <a:srcRect b="32265"/>
+          <a:stretch/>
+        </p:blipFill>
+        <p:spPr>
+          <a:xfrm>
+            <a:off x="531143" y="842110"/>
+            <a:ext cx="11062143" cy="5819948"/>
+          </a:xfrm>
+          <a:prstGeom prst="rect">
+            <a:avLst/>
+          </a:prstGeom>
+        </p:spPr>
+      </p:pic>
+    </p:spTree>
+    <p:extLst>
+      <p:ext uri="{BB962C8B-B14F-4D97-AF65-F5344CB8AC3E}">
+        <p14:creationId xmlns:p14="http://schemas.microsoft.com/office/powerpoint/2010/main" val="3555398275"/>
       </p:ext>
     </p:extLst>
   </p:cSld>

</xml_diff>